<commit_message>
tirado arquivos lua do gitignore, analizando passo a passo o teste unitario do web service
</commit_message>
<xml_diff>
--- a/Apresentacao/apresentacao-tcc.pptx
+++ b/Apresentacao/apresentacao-tcc.pptx
@@ -9,6 +9,7 @@
     <p:sldId id="257" r:id="rId3"/>
     <p:sldId id="258" r:id="rId4"/>
     <p:sldId id="259" r:id="rId5"/>
+    <p:sldId id="260" r:id="rId6"/>
   </p:sldIdLst>
   <p:sldSz cx="12192000" cy="6858000"/>
   <p:notesSz cx="6858000" cy="9144000"/>
@@ -107,6 +108,11 @@
       </a:defRPr>
     </a:lvl9pPr>
   </p:defaultTextStyle>
+  <p:extLst>
+    <p:ext uri="{EFAFB233-063F-42B5-8137-9DF3F51BA10A}">
+      <p15:sldGuideLst xmlns:p15="http://schemas.microsoft.com/office/powerpoint/2012/main"/>
+    </p:ext>
+  </p:extLst>
 </p:presentation>
 </file>
 
@@ -450,7 +456,7 @@
             <a:fld id="{5923F103-BC34-4FE4-A40E-EDDEECFDA5D0}" type="datetimeFigureOut">
               <a:rPr lang="en-US" dirty="0"/>
               <a:pPr/>
-              <a:t>7/6/2017</a:t>
+              <a:t>7/10/2017</a:t>
             </a:fld>
             <a:endParaRPr lang="en-US" dirty="0"/>
           </a:p>
@@ -1538,7 +1544,7 @@
           <a:p>
             <a:fld id="{923A1CC3-2375-41D4-9E03-427CAF2A4C1A}" type="datetimeFigureOut">
               <a:rPr lang="en-US" dirty="0"/>
-              <a:t>7/6/2017</a:t>
+              <a:t>7/10/2017</a:t>
             </a:fld>
             <a:endParaRPr lang="en-US" dirty="0"/>
           </a:p>
@@ -2518,7 +2524,7 @@
           <a:p>
             <a:fld id="{AFF16868-8199-4C2C-A5B1-63AEE139F88E}" type="datetimeFigureOut">
               <a:rPr lang="en-US" dirty="0"/>
-              <a:t>7/6/2017</a:t>
+              <a:t>7/10/2017</a:t>
             </a:fld>
             <a:endParaRPr lang="en-US" dirty="0"/>
           </a:p>
@@ -3652,7 +3658,7 @@
           <a:p>
             <a:fld id="{AAD9FF7F-6988-44CC-821B-644E70CD2F73}" type="datetimeFigureOut">
               <a:rPr lang="en-US" dirty="0"/>
-              <a:t>7/6/2017</a:t>
+              <a:t>7/10/2017</a:t>
             </a:fld>
             <a:endParaRPr lang="en-US" dirty="0"/>
           </a:p>
@@ -4685,7 +4691,7 @@
           <a:p>
             <a:fld id="{5C12C299-16B2-4475-990D-751901EACC14}" type="datetimeFigureOut">
               <a:rPr lang="en-US" dirty="0"/>
-              <a:t>7/6/2017</a:t>
+              <a:t>7/10/2017</a:t>
             </a:fld>
             <a:endParaRPr lang="en-US" dirty="0"/>
           </a:p>
@@ -5345,7 +5351,7 @@
           <a:p>
             <a:fld id="{9FE86839-B9D8-4651-8783-F325ECE74E65}" type="datetimeFigureOut">
               <a:rPr lang="en-US" dirty="0"/>
-              <a:t>7/6/2017</a:t>
+              <a:t>7/10/2017</a:t>
             </a:fld>
             <a:endParaRPr lang="en-US" dirty="0"/>
           </a:p>
@@ -6206,7 +6212,7 @@
           <a:p>
             <a:fld id="{FD484F64-32F6-45C5-931F-ADC1662401D0}" type="datetimeFigureOut">
               <a:rPr lang="en-US" dirty="0"/>
-              <a:t>7/6/2017</a:t>
+              <a:t>7/10/2017</a:t>
             </a:fld>
             <a:endParaRPr lang="en-US" dirty="0"/>
           </a:p>
@@ -6396,7 +6402,7 @@
           <a:p>
             <a:fld id="{53086D93-FCAC-47E0-A2EE-787E62CA814C}" type="datetimeFigureOut">
               <a:rPr lang="en-US" dirty="0"/>
-              <a:t>7/6/2017</a:t>
+              <a:t>7/10/2017</a:t>
             </a:fld>
             <a:endParaRPr lang="en-US" dirty="0"/>
           </a:p>
@@ -7368,7 +7374,7 @@
           <a:p>
             <a:fld id="{CDA879A6-0FD0-4734-A311-86BFCA472E6E}" type="datetimeFigureOut">
               <a:rPr lang="en-US" dirty="0"/>
-              <a:t>7/6/2017</a:t>
+              <a:t>7/10/2017</a:t>
             </a:fld>
             <a:endParaRPr lang="en-US" dirty="0"/>
           </a:p>
@@ -7579,7 +7585,7 @@
           <a:p>
             <a:fld id="{19C9CA7B-DFD4-44B5-8C60-D14B8CD1FB59}" type="datetimeFigureOut">
               <a:rPr lang="en-US" dirty="0"/>
-              <a:t>7/6/2017</a:t>
+              <a:t>7/10/2017</a:t>
             </a:fld>
             <a:endParaRPr lang="en-US" dirty="0"/>
           </a:p>
@@ -8613,7 +8619,7 @@
           <a:p>
             <a:fld id="{F34E6425-0181-43F2-84FC-787E803FD2F8}" type="datetimeFigureOut">
               <a:rPr lang="en-US" dirty="0"/>
-              <a:t>7/6/2017</a:t>
+              <a:t>7/10/2017</a:t>
             </a:fld>
             <a:endParaRPr lang="en-US" dirty="0"/>
           </a:p>
@@ -8885,7 +8891,7 @@
           <a:p>
             <a:fld id="{3BDB8791-F1B0-41E7-B7FD-A781E65C4266}" type="datetimeFigureOut">
               <a:rPr lang="en-US" dirty="0"/>
-              <a:t>7/6/2017</a:t>
+              <a:t>7/10/2017</a:t>
             </a:fld>
             <a:endParaRPr lang="en-US" dirty="0"/>
           </a:p>
@@ -9295,7 +9301,7 @@
           <a:p>
             <a:fld id="{5FDD63B2-E120-4ED8-B27B-C685F510A5FE}" type="datetimeFigureOut">
               <a:rPr lang="en-US" dirty="0"/>
-              <a:t>7/6/2017</a:t>
+              <a:t>7/10/2017</a:t>
             </a:fld>
             <a:endParaRPr lang="en-US" dirty="0"/>
           </a:p>
@@ -9422,7 +9428,7 @@
           <a:p>
             <a:fld id="{7AA18ACC-A947-437B-A130-35BD54FDF1E9}" type="datetimeFigureOut">
               <a:rPr lang="en-US" dirty="0"/>
-              <a:t>7/6/2017</a:t>
+              <a:t>7/10/2017</a:t>
             </a:fld>
             <a:endParaRPr lang="en-US" dirty="0"/>
           </a:p>
@@ -9517,7 +9523,7 @@
           <a:p>
             <a:fld id="{7C8D7E02-BCB8-4D50-A234-369438C08659}" type="datetimeFigureOut">
               <a:rPr lang="en-US" dirty="0"/>
-              <a:t>7/6/2017</a:t>
+              <a:t>7/10/2017</a:t>
             </a:fld>
             <a:endParaRPr lang="en-US" dirty="0"/>
           </a:p>
@@ -10598,7 +10604,7 @@
           <a:p>
             <a:fld id="{76E86A4C-8E40-4F87-A4F0-01A0687C5742}" type="datetimeFigureOut">
               <a:rPr lang="en-US" dirty="0"/>
-              <a:t>7/6/2017</a:t>
+              <a:t>7/10/2017</a:t>
             </a:fld>
             <a:endParaRPr lang="en-US" dirty="0"/>
           </a:p>
@@ -11706,7 +11712,7 @@
           <a:p>
             <a:fld id="{35E72C73-2D91-4E12-BA25-F0AA0C03599B}" type="datetimeFigureOut">
               <a:rPr lang="en-US" dirty="0"/>
-              <a:t>7/6/2017</a:t>
+              <a:t>7/10/2017</a:t>
             </a:fld>
             <a:endParaRPr lang="en-US" dirty="0"/>
           </a:p>
@@ -12703,7 +12709,7 @@
           <a:p>
             <a:fld id="{2BE451C3-0FF4-47C4-B829-773ADF60F88C}" type="datetimeFigureOut">
               <a:rPr lang="en-US" dirty="0"/>
-              <a:t>7/6/2017</a:t>
+              <a:t>7/10/2017</a:t>
             </a:fld>
             <a:endParaRPr lang="en-US" dirty="0"/>
           </a:p>
@@ -13293,7 +13299,7 @@
               <a:rPr lang="en-US" dirty="0">
                 <a:latin typeface="Algerian" panose="04020705040A02060702" pitchFamily="82" charset="0"/>
               </a:rPr>
-              <a:t>									DIVULGUE AQUI</a:t>
+              <a:t>									DIVULGUE</a:t>
             </a:r>
             <a:br>
               <a:rPr lang="pt-BR" dirty="0">
@@ -13304,13 +13310,25 @@
               <a:rPr lang="pt-BR" dirty="0">
                 <a:latin typeface="Algerian" panose="04020705040A02060702" pitchFamily="82" charset="0"/>
               </a:rPr>
-              <a:t>									GUS	</a:t>
+              <a:t>									</a:t>
             </a:r>
             <a:r>
               <a:rPr lang="en-US" dirty="0">
                 <a:latin typeface="Algerian" panose="04020705040A02060702" pitchFamily="82" charset="0"/>
               </a:rPr>
-              <a:t> 				</a:t>
+              <a:t> 						</a:t>
+            </a:r>
+            <a:r>
+              <a:rPr lang="en-US" dirty="0" err="1">
+                <a:latin typeface="Algerian" panose="04020705040A02060702" pitchFamily="82" charset="0"/>
+              </a:rPr>
+              <a:t>Aqui</a:t>
+            </a:r>
+            <a:r>
+              <a:rPr lang="en-US" dirty="0">
+                <a:latin typeface="Algerian" panose="04020705040A02060702" pitchFamily="82" charset="0"/>
+              </a:rPr>
+              <a:t>	</a:t>
             </a:r>
             <a:endParaRPr lang="pt-BR" dirty="0"/>
           </a:p>
@@ -13824,10 +13842,10 @@
       </p:sp>
       <p:pic>
         <p:nvPicPr>
-          <p:cNvPr id="17" name="Espaço Reservado para Conteúdo 16">
+          <p:cNvPr id="6" name="Espaço Reservado para Conteúdo 5" descr="Uma imagem contendo captura de tela&#10;&#10;Descrição gerada com muito alta confiança">
             <a:extLst>
               <a:ext uri="{FF2B5EF4-FFF2-40B4-BE49-F238E27FC236}">
-                <a16:creationId xmlns:a16="http://schemas.microsoft.com/office/drawing/2014/main" id="{3E9B4CDC-E1C8-416C-AAF2-407D761BD17F}"/>
+                <a16:creationId xmlns:a16="http://schemas.microsoft.com/office/drawing/2014/main" id="{FCD2FDB7-6D08-415C-97CE-3F8666567A64}"/>
               </a:ext>
             </a:extLst>
           </p:cNvPr>
@@ -13846,17 +13864,17 @@
         </p:blipFill>
         <p:spPr>
           <a:xfrm>
-            <a:off x="3216058" y="2843342"/>
-            <a:ext cx="1921668" cy="3416300"/>
+            <a:off x="1154954" y="2614011"/>
+            <a:ext cx="1887794" cy="3416300"/>
           </a:xfrm>
         </p:spPr>
       </p:pic>
       <p:pic>
         <p:nvPicPr>
-          <p:cNvPr id="21" name="Imagem 20">
+          <p:cNvPr id="8" name="Imagem 7" descr="Uma imagem contendo captura de tela&#10;&#10;Descrição gerada com muito alta confiança">
             <a:extLst>
               <a:ext uri="{FF2B5EF4-FFF2-40B4-BE49-F238E27FC236}">
-                <a16:creationId xmlns:a16="http://schemas.microsoft.com/office/drawing/2014/main" id="{63A71C1F-41BB-4A53-B861-3BE9C1401D0A}"/>
+                <a16:creationId xmlns:a16="http://schemas.microsoft.com/office/drawing/2014/main" id="{6475673D-F0B1-46D0-BF7B-FF6DCB5E3DD8}"/>
               </a:ext>
             </a:extLst>
           </p:cNvPr>
@@ -13873,8 +13891,8 @@
         </p:blipFill>
         <p:spPr>
           <a:xfrm>
-            <a:off x="1095366" y="2843342"/>
-            <a:ext cx="1955800" cy="3416300"/>
+            <a:off x="3147032" y="2614011"/>
+            <a:ext cx="1906882" cy="3417766"/>
           </a:xfrm>
           <a:prstGeom prst="rect">
             <a:avLst/>
@@ -13883,10 +13901,10 @@
       </p:pic>
       <p:pic>
         <p:nvPicPr>
-          <p:cNvPr id="23" name="Imagem 22">
+          <p:cNvPr id="10" name="Imagem 9" descr="Uma imagem contendo captura de tela&#10;&#10;Descrição gerada com muito alta confiança">
             <a:extLst>
               <a:ext uri="{FF2B5EF4-FFF2-40B4-BE49-F238E27FC236}">
-                <a16:creationId xmlns:a16="http://schemas.microsoft.com/office/drawing/2014/main" id="{1D2B8C36-4C44-4984-B741-89A8C184F984}"/>
+                <a16:creationId xmlns:a16="http://schemas.microsoft.com/office/drawing/2014/main" id="{DA7DF9A1-7B7D-4315-82D5-DF98C090197A}"/>
               </a:ext>
             </a:extLst>
           </p:cNvPr>
@@ -13903,68 +13921,8 @@
         </p:blipFill>
         <p:spPr>
           <a:xfrm>
-            <a:off x="5362206" y="2843342"/>
-            <a:ext cx="1893033" cy="3416300"/>
-          </a:xfrm>
-          <a:prstGeom prst="rect">
-            <a:avLst/>
-          </a:prstGeom>
-        </p:spPr>
-      </p:pic>
-      <p:pic>
-        <p:nvPicPr>
-          <p:cNvPr id="25" name="Imagem 24">
-            <a:extLst>
-              <a:ext uri="{FF2B5EF4-FFF2-40B4-BE49-F238E27FC236}">
-                <a16:creationId xmlns:a16="http://schemas.microsoft.com/office/drawing/2014/main" id="{10DE81F9-FC58-4162-84E7-1A3F936E0867}"/>
-              </a:ext>
-            </a:extLst>
-          </p:cNvPr>
-          <p:cNvPicPr>
-            <a:picLocks noChangeAspect="1"/>
-          </p:cNvPicPr>
-          <p:nvPr/>
-        </p:nvPicPr>
-        <p:blipFill>
-          <a:blip r:embed="rId5"/>
-          <a:stretch>
-            <a:fillRect/>
-          </a:stretch>
-        </p:blipFill>
-        <p:spPr>
-          <a:xfrm>
-            <a:off x="7420131" y="2843342"/>
-            <a:ext cx="1896212" cy="3438026"/>
-          </a:xfrm>
-          <a:prstGeom prst="rect">
-            <a:avLst/>
-          </a:prstGeom>
-        </p:spPr>
-      </p:pic>
-      <p:pic>
-        <p:nvPicPr>
-          <p:cNvPr id="27" name="Imagem 26">
-            <a:extLst>
-              <a:ext uri="{FF2B5EF4-FFF2-40B4-BE49-F238E27FC236}">
-                <a16:creationId xmlns:a16="http://schemas.microsoft.com/office/drawing/2014/main" id="{5172E2B8-4E17-4FA8-A500-EFEA7EF555DD}"/>
-              </a:ext>
-            </a:extLst>
-          </p:cNvPr>
-          <p:cNvPicPr>
-            <a:picLocks noChangeAspect="1"/>
-          </p:cNvPicPr>
-          <p:nvPr/>
-        </p:nvPicPr>
-        <p:blipFill>
-          <a:blip r:embed="rId6"/>
-          <a:stretch>
-            <a:fillRect/>
-          </a:stretch>
-        </p:blipFill>
-        <p:spPr>
-          <a:xfrm>
-            <a:off x="9540823" y="2843342"/>
-            <a:ext cx="1968357" cy="3438026"/>
+            <a:off x="5158198" y="2614011"/>
+            <a:ext cx="1909867" cy="3424379"/>
           </a:xfrm>
           <a:prstGeom prst="rect">
             <a:avLst/>
@@ -13975,6 +13933,86 @@
     <p:extLst>
       <p:ext uri="{BB962C8B-B14F-4D97-AF65-F5344CB8AC3E}">
         <p14:creationId xmlns:p14="http://schemas.microsoft.com/office/powerpoint/2010/main" val="2563417386"/>
+      </p:ext>
+    </p:extLst>
+  </p:cSld>
+  <p:clrMapOvr>
+    <a:masterClrMapping/>
+  </p:clrMapOvr>
+</p:sld>
+</file>
+
+<file path=ppt/slides/slide5.xml><?xml version="1.0" encoding="utf-8"?>
+<p:sld xmlns:a="http://schemas.openxmlformats.org/drawingml/2006/main" xmlns:r="http://schemas.openxmlformats.org/officeDocument/2006/relationships" xmlns:p="http://schemas.openxmlformats.org/presentationml/2006/main">
+  <p:cSld>
+    <p:spTree>
+      <p:nvGrpSpPr>
+        <p:cNvPr id="1" name=""/>
+        <p:cNvGrpSpPr/>
+        <p:nvPr/>
+      </p:nvGrpSpPr>
+      <p:grpSpPr>
+        <a:xfrm>
+          <a:off x="0" y="0"/>
+          <a:ext cx="0" cy="0"/>
+          <a:chOff x="0" y="0"/>
+          <a:chExt cx="0" cy="0"/>
+        </a:xfrm>
+      </p:grpSpPr>
+      <p:sp>
+        <p:nvSpPr>
+          <p:cNvPr id="2" name="Título 1">
+            <a:extLst>
+              <a:ext uri="{FF2B5EF4-FFF2-40B4-BE49-F238E27FC236}">
+                <a16:creationId xmlns:a16="http://schemas.microsoft.com/office/drawing/2014/main" id="{8F9F8566-76E7-40CB-8D28-B2523F011FFC}"/>
+              </a:ext>
+            </a:extLst>
+          </p:cNvPr>
+          <p:cNvSpPr>
+            <a:spLocks noGrp="1"/>
+          </p:cNvSpPr>
+          <p:nvPr>
+            <p:ph type="title"/>
+          </p:nvPr>
+        </p:nvSpPr>
+        <p:spPr/>
+        <p:txBody>
+          <a:bodyPr/>
+          <a:lstStyle/>
+          <a:p>
+            <a:endParaRPr lang="pt-BR"/>
+          </a:p>
+        </p:txBody>
+      </p:sp>
+      <p:sp>
+        <p:nvSpPr>
+          <p:cNvPr id="3" name="Espaço Reservado para Conteúdo 2">
+            <a:extLst>
+              <a:ext uri="{FF2B5EF4-FFF2-40B4-BE49-F238E27FC236}">
+                <a16:creationId xmlns:a16="http://schemas.microsoft.com/office/drawing/2014/main" id="{C4B45AAC-553F-4406-BF99-DEF2C8D23469}"/>
+              </a:ext>
+            </a:extLst>
+          </p:cNvPr>
+          <p:cNvSpPr>
+            <a:spLocks noGrp="1"/>
+          </p:cNvSpPr>
+          <p:nvPr>
+            <p:ph idx="1"/>
+          </p:nvPr>
+        </p:nvSpPr>
+        <p:spPr/>
+        <p:txBody>
+          <a:bodyPr/>
+          <a:lstStyle/>
+          <a:p>
+            <a:endParaRPr lang="pt-BR"/>
+          </a:p>
+        </p:txBody>
+      </p:sp>
+    </p:spTree>
+    <p:extLst>
+      <p:ext uri="{BB962C8B-B14F-4D97-AF65-F5344CB8AC3E}">
+        <p14:creationId xmlns:p14="http://schemas.microsoft.com/office/powerpoint/2010/main" val="2742067459"/>
       </p:ext>
     </p:extLst>
   </p:cSld>

</xml_diff>

<commit_message>
colocado o botao de voltar no mobile, resolvido bronca com teste de software de inserir publicacao
</commit_message>
<xml_diff>
--- a/Apresentacao/apresentacao-tcc.pptx
+++ b/Apresentacao/apresentacao-tcc.pptx
@@ -10,6 +10,7 @@
     <p:sldId id="258" r:id="rId4"/>
     <p:sldId id="259" r:id="rId5"/>
     <p:sldId id="260" r:id="rId6"/>
+    <p:sldId id="261" r:id="rId7"/>
   </p:sldIdLst>
   <p:sldSz cx="12192000" cy="6858000"/>
   <p:notesSz cx="6858000" cy="9144000"/>
@@ -13929,6 +13930,66 @@
           </a:prstGeom>
         </p:spPr>
       </p:pic>
+      <p:pic>
+        <p:nvPicPr>
+          <p:cNvPr id="4" name="Imagem 3">
+            <a:extLst>
+              <a:ext uri="{FF2B5EF4-FFF2-40B4-BE49-F238E27FC236}">
+                <a16:creationId xmlns:a16="http://schemas.microsoft.com/office/drawing/2014/main" id="{7E0525E7-37BE-4460-8E95-8EB08B2CBD93}"/>
+              </a:ext>
+            </a:extLst>
+          </p:cNvPr>
+          <p:cNvPicPr>
+            <a:picLocks noChangeAspect="1"/>
+          </p:cNvPicPr>
+          <p:nvPr/>
+        </p:nvPicPr>
+        <p:blipFill>
+          <a:blip r:embed="rId5"/>
+          <a:stretch>
+            <a:fillRect/>
+          </a:stretch>
+        </p:blipFill>
+        <p:spPr>
+          <a:xfrm>
+            <a:off x="7169364" y="2614011"/>
+            <a:ext cx="1906818" cy="3440828"/>
+          </a:xfrm>
+          <a:prstGeom prst="rect">
+            <a:avLst/>
+          </a:prstGeom>
+        </p:spPr>
+      </p:pic>
+      <p:pic>
+        <p:nvPicPr>
+          <p:cNvPr id="7" name="Imagem 6">
+            <a:extLst>
+              <a:ext uri="{FF2B5EF4-FFF2-40B4-BE49-F238E27FC236}">
+                <a16:creationId xmlns:a16="http://schemas.microsoft.com/office/drawing/2014/main" id="{52BDE8FD-D550-4D38-A573-141C76E88DA4}"/>
+              </a:ext>
+            </a:extLst>
+          </p:cNvPr>
+          <p:cNvPicPr>
+            <a:picLocks noChangeAspect="1"/>
+          </p:cNvPicPr>
+          <p:nvPr/>
+        </p:nvPicPr>
+        <p:blipFill>
+          <a:blip r:embed="rId6"/>
+          <a:stretch>
+            <a:fillRect/>
+          </a:stretch>
+        </p:blipFill>
+        <p:spPr>
+          <a:xfrm>
+            <a:off x="9177481" y="2614011"/>
+            <a:ext cx="1892528" cy="3411450"/>
+          </a:xfrm>
+          <a:prstGeom prst="rect">
+            <a:avLst/>
+          </a:prstGeom>
+        </p:spPr>
+      </p:pic>
     </p:spTree>
     <p:extLst>
       <p:ext uri="{BB962C8B-B14F-4D97-AF65-F5344CB8AC3E}">
@@ -13984,12 +14045,101 @@
           </a:p>
         </p:txBody>
       </p:sp>
+      <p:pic>
+        <p:nvPicPr>
+          <p:cNvPr id="5" name="Espaço Reservado para Conteúdo 4">
+            <a:extLst>
+              <a:ext uri="{FF2B5EF4-FFF2-40B4-BE49-F238E27FC236}">
+                <a16:creationId xmlns:a16="http://schemas.microsoft.com/office/drawing/2014/main" id="{906AFE7A-2108-4926-B13E-7DE2F5C42768}"/>
+              </a:ext>
+            </a:extLst>
+          </p:cNvPr>
+          <p:cNvPicPr>
+            <a:picLocks noGrp="1" noChangeAspect="1"/>
+          </p:cNvPicPr>
+          <p:nvPr>
+            <p:ph idx="1"/>
+          </p:nvPr>
+        </p:nvPicPr>
+        <p:blipFill>
+          <a:blip r:embed="rId2"/>
+          <a:stretch>
+            <a:fillRect/>
+          </a:stretch>
+        </p:blipFill>
+        <p:spPr>
+          <a:xfrm>
+            <a:off x="482224" y="2990499"/>
+            <a:ext cx="5456772" cy="3067937"/>
+          </a:xfrm>
+        </p:spPr>
+      </p:pic>
+      <p:pic>
+        <p:nvPicPr>
+          <p:cNvPr id="7" name="Imagem 6">
+            <a:extLst>
+              <a:ext uri="{FF2B5EF4-FFF2-40B4-BE49-F238E27FC236}">
+                <a16:creationId xmlns:a16="http://schemas.microsoft.com/office/drawing/2014/main" id="{4669AC90-D6E1-4766-9302-254B5FBC93DE}"/>
+              </a:ext>
+            </a:extLst>
+          </p:cNvPr>
+          <p:cNvPicPr>
+            <a:picLocks noChangeAspect="1"/>
+          </p:cNvPicPr>
+          <p:nvPr/>
+        </p:nvPicPr>
+        <p:blipFill>
+          <a:blip r:embed="rId3"/>
+          <a:stretch>
+            <a:fillRect/>
+          </a:stretch>
+        </p:blipFill>
+        <p:spPr>
+          <a:xfrm>
+            <a:off x="6055763" y="2990499"/>
+            <a:ext cx="5612495" cy="3067937"/>
+          </a:xfrm>
+          <a:prstGeom prst="rect">
+            <a:avLst/>
+          </a:prstGeom>
+        </p:spPr>
+      </p:pic>
+    </p:spTree>
+    <p:extLst>
+      <p:ext uri="{BB962C8B-B14F-4D97-AF65-F5344CB8AC3E}">
+        <p14:creationId xmlns:p14="http://schemas.microsoft.com/office/powerpoint/2010/main" val="2742067459"/>
+      </p:ext>
+    </p:extLst>
+  </p:cSld>
+  <p:clrMapOvr>
+    <a:masterClrMapping/>
+  </p:clrMapOvr>
+</p:sld>
+</file>
+
+<file path=ppt/slides/slide6.xml><?xml version="1.0" encoding="utf-8"?>
+<p:sld xmlns:a="http://schemas.openxmlformats.org/drawingml/2006/main" xmlns:r="http://schemas.openxmlformats.org/officeDocument/2006/relationships" xmlns:p="http://schemas.openxmlformats.org/presentationml/2006/main">
+  <p:cSld>
+    <p:spTree>
+      <p:nvGrpSpPr>
+        <p:cNvPr id="1" name=""/>
+        <p:cNvGrpSpPr/>
+        <p:nvPr/>
+      </p:nvGrpSpPr>
+      <p:grpSpPr>
+        <a:xfrm>
+          <a:off x="0" y="0"/>
+          <a:ext cx="0" cy="0"/>
+          <a:chOff x="0" y="0"/>
+          <a:chExt cx="0" cy="0"/>
+        </a:xfrm>
+      </p:grpSpPr>
       <p:sp>
         <p:nvSpPr>
-          <p:cNvPr id="3" name="Espaço Reservado para Conteúdo 2">
+          <p:cNvPr id="2" name="Título 1">
             <a:extLst>
               <a:ext uri="{FF2B5EF4-FFF2-40B4-BE49-F238E27FC236}">
-                <a16:creationId xmlns:a16="http://schemas.microsoft.com/office/drawing/2014/main" id="{C4B45AAC-553F-4406-BF99-DEF2C8D23469}"/>
+                <a16:creationId xmlns:a16="http://schemas.microsoft.com/office/drawing/2014/main" id="{B1BDF05E-08C2-47AC-995A-F9C4B7F02D88}"/>
               </a:ext>
             </a:extLst>
           </p:cNvPr>
@@ -13997,7 +14147,7 @@
             <a:spLocks noGrp="1"/>
           </p:cNvSpPr>
           <p:nvPr>
-            <p:ph idx="1"/>
+            <p:ph type="title"/>
           </p:nvPr>
         </p:nvSpPr>
         <p:spPr/>
@@ -14009,10 +14159,69 @@
           </a:p>
         </p:txBody>
       </p:sp>
+      <p:pic>
+        <p:nvPicPr>
+          <p:cNvPr id="5" name="Espaço Reservado para Conteúdo 4">
+            <a:extLst>
+              <a:ext uri="{FF2B5EF4-FFF2-40B4-BE49-F238E27FC236}">
+                <a16:creationId xmlns:a16="http://schemas.microsoft.com/office/drawing/2014/main" id="{7632AF23-2AF8-45B5-8177-A41E1DA73ED8}"/>
+              </a:ext>
+            </a:extLst>
+          </p:cNvPr>
+          <p:cNvPicPr>
+            <a:picLocks noGrp="1" noChangeAspect="1"/>
+          </p:cNvPicPr>
+          <p:nvPr>
+            <p:ph idx="1"/>
+          </p:nvPr>
+        </p:nvPicPr>
+        <p:blipFill>
+          <a:blip r:embed="rId2"/>
+          <a:stretch>
+            <a:fillRect/>
+          </a:stretch>
+        </p:blipFill>
+        <p:spPr>
+          <a:xfrm>
+            <a:off x="502275" y="2831403"/>
+            <a:ext cx="5473521" cy="3175518"/>
+          </a:xfrm>
+        </p:spPr>
+      </p:pic>
+      <p:pic>
+        <p:nvPicPr>
+          <p:cNvPr id="7" name="Imagem 6">
+            <a:extLst>
+              <a:ext uri="{FF2B5EF4-FFF2-40B4-BE49-F238E27FC236}">
+                <a16:creationId xmlns:a16="http://schemas.microsoft.com/office/drawing/2014/main" id="{4DA4D170-CCF1-4606-B5F2-1A35327D4244}"/>
+              </a:ext>
+            </a:extLst>
+          </p:cNvPr>
+          <p:cNvPicPr>
+            <a:picLocks noChangeAspect="1"/>
+          </p:cNvPicPr>
+          <p:nvPr/>
+        </p:nvPicPr>
+        <p:blipFill>
+          <a:blip r:embed="rId3"/>
+          <a:stretch>
+            <a:fillRect/>
+          </a:stretch>
+        </p:blipFill>
+        <p:spPr>
+          <a:xfrm>
+            <a:off x="6091709" y="2831403"/>
+            <a:ext cx="5620512" cy="3159995"/>
+          </a:xfrm>
+          <a:prstGeom prst="rect">
+            <a:avLst/>
+          </a:prstGeom>
+        </p:spPr>
+      </p:pic>
     </p:spTree>
     <p:extLst>
       <p:ext uri="{BB962C8B-B14F-4D97-AF65-F5344CB8AC3E}">
-        <p14:creationId xmlns:p14="http://schemas.microsoft.com/office/powerpoint/2010/main" val="2742067459"/>
+        <p14:creationId xmlns:p14="http://schemas.microsoft.com/office/powerpoint/2010/main" val="2914233779"/>
       </p:ext>
     </p:extLst>
   </p:cSld>

</xml_diff>

<commit_message>
terminando ultimas alteracoes antes da apresentacao
</commit_message>
<xml_diff>
--- a/Apresentacao/apresentacao-tcc.pptx
+++ b/Apresentacao/apresentacao-tcc.pptx
@@ -10,6 +10,7 @@
     <p:sldId id="258" r:id="rId4"/>
     <p:sldId id="259" r:id="rId5"/>
     <p:sldId id="260" r:id="rId6"/>
+    <p:sldId id="261" r:id="rId7"/>
   </p:sldIdLst>
   <p:sldSz cx="12192000" cy="6858000"/>
   <p:notesSz cx="6858000" cy="9144000"/>
@@ -456,7 +457,7 @@
             <a:fld id="{5923F103-BC34-4FE4-A40E-EDDEECFDA5D0}" type="datetimeFigureOut">
               <a:rPr lang="en-US" dirty="0"/>
               <a:pPr/>
-              <a:t>7/10/2017</a:t>
+              <a:t>7/11/2017</a:t>
             </a:fld>
             <a:endParaRPr lang="en-US" dirty="0"/>
           </a:p>
@@ -1544,7 +1545,7 @@
           <a:p>
             <a:fld id="{923A1CC3-2375-41D4-9E03-427CAF2A4C1A}" type="datetimeFigureOut">
               <a:rPr lang="en-US" dirty="0"/>
-              <a:t>7/10/2017</a:t>
+              <a:t>7/11/2017</a:t>
             </a:fld>
             <a:endParaRPr lang="en-US" dirty="0"/>
           </a:p>
@@ -2524,7 +2525,7 @@
           <a:p>
             <a:fld id="{AFF16868-8199-4C2C-A5B1-63AEE139F88E}" type="datetimeFigureOut">
               <a:rPr lang="en-US" dirty="0"/>
-              <a:t>7/10/2017</a:t>
+              <a:t>7/11/2017</a:t>
             </a:fld>
             <a:endParaRPr lang="en-US" dirty="0"/>
           </a:p>
@@ -3658,7 +3659,7 @@
           <a:p>
             <a:fld id="{AAD9FF7F-6988-44CC-821B-644E70CD2F73}" type="datetimeFigureOut">
               <a:rPr lang="en-US" dirty="0"/>
-              <a:t>7/10/2017</a:t>
+              <a:t>7/11/2017</a:t>
             </a:fld>
             <a:endParaRPr lang="en-US" dirty="0"/>
           </a:p>
@@ -4691,7 +4692,7 @@
           <a:p>
             <a:fld id="{5C12C299-16B2-4475-990D-751901EACC14}" type="datetimeFigureOut">
               <a:rPr lang="en-US" dirty="0"/>
-              <a:t>7/10/2017</a:t>
+              <a:t>7/11/2017</a:t>
             </a:fld>
             <a:endParaRPr lang="en-US" dirty="0"/>
           </a:p>
@@ -5351,7 +5352,7 @@
           <a:p>
             <a:fld id="{9FE86839-B9D8-4651-8783-F325ECE74E65}" type="datetimeFigureOut">
               <a:rPr lang="en-US" dirty="0"/>
-              <a:t>7/10/2017</a:t>
+              <a:t>7/11/2017</a:t>
             </a:fld>
             <a:endParaRPr lang="en-US" dirty="0"/>
           </a:p>
@@ -6212,7 +6213,7 @@
           <a:p>
             <a:fld id="{FD484F64-32F6-45C5-931F-ADC1662401D0}" type="datetimeFigureOut">
               <a:rPr lang="en-US" dirty="0"/>
-              <a:t>7/10/2017</a:t>
+              <a:t>7/11/2017</a:t>
             </a:fld>
             <a:endParaRPr lang="en-US" dirty="0"/>
           </a:p>
@@ -6402,7 +6403,7 @@
           <a:p>
             <a:fld id="{53086D93-FCAC-47E0-A2EE-787E62CA814C}" type="datetimeFigureOut">
               <a:rPr lang="en-US" dirty="0"/>
-              <a:t>7/10/2017</a:t>
+              <a:t>7/11/2017</a:t>
             </a:fld>
             <a:endParaRPr lang="en-US" dirty="0"/>
           </a:p>
@@ -7374,7 +7375,7 @@
           <a:p>
             <a:fld id="{CDA879A6-0FD0-4734-A311-86BFCA472E6E}" type="datetimeFigureOut">
               <a:rPr lang="en-US" dirty="0"/>
-              <a:t>7/10/2017</a:t>
+              <a:t>7/11/2017</a:t>
             </a:fld>
             <a:endParaRPr lang="en-US" dirty="0"/>
           </a:p>
@@ -7585,7 +7586,7 @@
           <a:p>
             <a:fld id="{19C9CA7B-DFD4-44B5-8C60-D14B8CD1FB59}" type="datetimeFigureOut">
               <a:rPr lang="en-US" dirty="0"/>
-              <a:t>7/10/2017</a:t>
+              <a:t>7/11/2017</a:t>
             </a:fld>
             <a:endParaRPr lang="en-US" dirty="0"/>
           </a:p>
@@ -8619,7 +8620,7 @@
           <a:p>
             <a:fld id="{F34E6425-0181-43F2-84FC-787E803FD2F8}" type="datetimeFigureOut">
               <a:rPr lang="en-US" dirty="0"/>
-              <a:t>7/10/2017</a:t>
+              <a:t>7/11/2017</a:t>
             </a:fld>
             <a:endParaRPr lang="en-US" dirty="0"/>
           </a:p>
@@ -8891,7 +8892,7 @@
           <a:p>
             <a:fld id="{3BDB8791-F1B0-41E7-B7FD-A781E65C4266}" type="datetimeFigureOut">
               <a:rPr lang="en-US" dirty="0"/>
-              <a:t>7/10/2017</a:t>
+              <a:t>7/11/2017</a:t>
             </a:fld>
             <a:endParaRPr lang="en-US" dirty="0"/>
           </a:p>
@@ -9301,7 +9302,7 @@
           <a:p>
             <a:fld id="{5FDD63B2-E120-4ED8-B27B-C685F510A5FE}" type="datetimeFigureOut">
               <a:rPr lang="en-US" dirty="0"/>
-              <a:t>7/10/2017</a:t>
+              <a:t>7/11/2017</a:t>
             </a:fld>
             <a:endParaRPr lang="en-US" dirty="0"/>
           </a:p>
@@ -9428,7 +9429,7 @@
           <a:p>
             <a:fld id="{7AA18ACC-A947-437B-A130-35BD54FDF1E9}" type="datetimeFigureOut">
               <a:rPr lang="en-US" dirty="0"/>
-              <a:t>7/10/2017</a:t>
+              <a:t>7/11/2017</a:t>
             </a:fld>
             <a:endParaRPr lang="en-US" dirty="0"/>
           </a:p>
@@ -9523,7 +9524,7 @@
           <a:p>
             <a:fld id="{7C8D7E02-BCB8-4D50-A234-369438C08659}" type="datetimeFigureOut">
               <a:rPr lang="en-US" dirty="0"/>
-              <a:t>7/10/2017</a:t>
+              <a:t>7/11/2017</a:t>
             </a:fld>
             <a:endParaRPr lang="en-US" dirty="0"/>
           </a:p>
@@ -10604,7 +10605,7 @@
           <a:p>
             <a:fld id="{76E86A4C-8E40-4F87-A4F0-01A0687C5742}" type="datetimeFigureOut">
               <a:rPr lang="en-US" dirty="0"/>
-              <a:t>7/10/2017</a:t>
+              <a:t>7/11/2017</a:t>
             </a:fld>
             <a:endParaRPr lang="en-US" dirty="0"/>
           </a:p>
@@ -11712,7 +11713,7 @@
           <a:p>
             <a:fld id="{35E72C73-2D91-4E12-BA25-F0AA0C03599B}" type="datetimeFigureOut">
               <a:rPr lang="en-US" dirty="0"/>
-              <a:t>7/10/2017</a:t>
+              <a:t>7/11/2017</a:t>
             </a:fld>
             <a:endParaRPr lang="en-US" dirty="0"/>
           </a:p>
@@ -12709,7 +12710,7 @@
           <a:p>
             <a:fld id="{2BE451C3-0FF4-47C4-B829-773ADF60F88C}" type="datetimeFigureOut">
               <a:rPr lang="en-US" dirty="0"/>
-              <a:t>7/10/2017</a:t>
+              <a:t>7/11/2017</a:t>
             </a:fld>
             <a:endParaRPr lang="en-US" dirty="0"/>
           </a:p>
@@ -13591,7 +13592,12 @@
             <p:ph type="title"/>
           </p:nvPr>
         </p:nvSpPr>
-        <p:spPr/>
+        <p:spPr>
+          <a:xfrm>
+            <a:off x="1154954" y="973668"/>
+            <a:ext cx="8761413" cy="706964"/>
+          </a:xfrm>
+        </p:spPr>
         <p:txBody>
           <a:bodyPr/>
           <a:lstStyle/>
@@ -13677,6 +13683,13 @@
               <a:rPr lang="pt-BR" sz="2000" dirty="0"/>
               <a:t>A dificuldade das pessoas relatarem problemas de infraestrutura encontradas na cidade.</a:t>
             </a:r>
+          </a:p>
+          <a:p>
+            <a:r>
+              <a:rPr lang="pt-BR" dirty="0"/>
+              <a:t>A dificuldade da prefeitura em saber como priorizar algumas ações</a:t>
+            </a:r>
+            <a:endParaRPr lang="pt-BR" sz="2000" dirty="0"/>
           </a:p>
         </p:txBody>
       </p:sp>
@@ -13929,6 +13942,66 @@
           </a:prstGeom>
         </p:spPr>
       </p:pic>
+      <p:pic>
+        <p:nvPicPr>
+          <p:cNvPr id="4" name="Imagem 3">
+            <a:extLst>
+              <a:ext uri="{FF2B5EF4-FFF2-40B4-BE49-F238E27FC236}">
+                <a16:creationId xmlns:a16="http://schemas.microsoft.com/office/drawing/2014/main" id="{7E0525E7-37BE-4460-8E95-8EB08B2CBD93}"/>
+              </a:ext>
+            </a:extLst>
+          </p:cNvPr>
+          <p:cNvPicPr>
+            <a:picLocks noChangeAspect="1"/>
+          </p:cNvPicPr>
+          <p:nvPr/>
+        </p:nvPicPr>
+        <p:blipFill>
+          <a:blip r:embed="rId5"/>
+          <a:stretch>
+            <a:fillRect/>
+          </a:stretch>
+        </p:blipFill>
+        <p:spPr>
+          <a:xfrm>
+            <a:off x="7169364" y="2614011"/>
+            <a:ext cx="1906818" cy="3440828"/>
+          </a:xfrm>
+          <a:prstGeom prst="rect">
+            <a:avLst/>
+          </a:prstGeom>
+        </p:spPr>
+      </p:pic>
+      <p:pic>
+        <p:nvPicPr>
+          <p:cNvPr id="7" name="Imagem 6">
+            <a:extLst>
+              <a:ext uri="{FF2B5EF4-FFF2-40B4-BE49-F238E27FC236}">
+                <a16:creationId xmlns:a16="http://schemas.microsoft.com/office/drawing/2014/main" id="{52BDE8FD-D550-4D38-A573-141C76E88DA4}"/>
+              </a:ext>
+            </a:extLst>
+          </p:cNvPr>
+          <p:cNvPicPr>
+            <a:picLocks noChangeAspect="1"/>
+          </p:cNvPicPr>
+          <p:nvPr/>
+        </p:nvPicPr>
+        <p:blipFill>
+          <a:blip r:embed="rId6"/>
+          <a:stretch>
+            <a:fillRect/>
+          </a:stretch>
+        </p:blipFill>
+        <p:spPr>
+          <a:xfrm>
+            <a:off x="9177481" y="2614011"/>
+            <a:ext cx="1892528" cy="3411450"/>
+          </a:xfrm>
+          <a:prstGeom prst="rect">
+            <a:avLst/>
+          </a:prstGeom>
+        </p:spPr>
+      </p:pic>
     </p:spTree>
     <p:extLst>
       <p:ext uri="{BB962C8B-B14F-4D97-AF65-F5344CB8AC3E}">
@@ -13984,12 +14057,101 @@
           </a:p>
         </p:txBody>
       </p:sp>
+      <p:pic>
+        <p:nvPicPr>
+          <p:cNvPr id="5" name="Espaço Reservado para Conteúdo 4">
+            <a:extLst>
+              <a:ext uri="{FF2B5EF4-FFF2-40B4-BE49-F238E27FC236}">
+                <a16:creationId xmlns:a16="http://schemas.microsoft.com/office/drawing/2014/main" id="{906AFE7A-2108-4926-B13E-7DE2F5C42768}"/>
+              </a:ext>
+            </a:extLst>
+          </p:cNvPr>
+          <p:cNvPicPr>
+            <a:picLocks noGrp="1" noChangeAspect="1"/>
+          </p:cNvPicPr>
+          <p:nvPr>
+            <p:ph idx="1"/>
+          </p:nvPr>
+        </p:nvPicPr>
+        <p:blipFill>
+          <a:blip r:embed="rId2"/>
+          <a:stretch>
+            <a:fillRect/>
+          </a:stretch>
+        </p:blipFill>
+        <p:spPr>
+          <a:xfrm>
+            <a:off x="482224" y="2990499"/>
+            <a:ext cx="5456772" cy="3067937"/>
+          </a:xfrm>
+        </p:spPr>
+      </p:pic>
+      <p:pic>
+        <p:nvPicPr>
+          <p:cNvPr id="7" name="Imagem 6">
+            <a:extLst>
+              <a:ext uri="{FF2B5EF4-FFF2-40B4-BE49-F238E27FC236}">
+                <a16:creationId xmlns:a16="http://schemas.microsoft.com/office/drawing/2014/main" id="{4669AC90-D6E1-4766-9302-254B5FBC93DE}"/>
+              </a:ext>
+            </a:extLst>
+          </p:cNvPr>
+          <p:cNvPicPr>
+            <a:picLocks noChangeAspect="1"/>
+          </p:cNvPicPr>
+          <p:nvPr/>
+        </p:nvPicPr>
+        <p:blipFill>
+          <a:blip r:embed="rId3"/>
+          <a:stretch>
+            <a:fillRect/>
+          </a:stretch>
+        </p:blipFill>
+        <p:spPr>
+          <a:xfrm>
+            <a:off x="6055763" y="2990499"/>
+            <a:ext cx="5612495" cy="3067937"/>
+          </a:xfrm>
+          <a:prstGeom prst="rect">
+            <a:avLst/>
+          </a:prstGeom>
+        </p:spPr>
+      </p:pic>
+    </p:spTree>
+    <p:extLst>
+      <p:ext uri="{BB962C8B-B14F-4D97-AF65-F5344CB8AC3E}">
+        <p14:creationId xmlns:p14="http://schemas.microsoft.com/office/powerpoint/2010/main" val="2742067459"/>
+      </p:ext>
+    </p:extLst>
+  </p:cSld>
+  <p:clrMapOvr>
+    <a:masterClrMapping/>
+  </p:clrMapOvr>
+</p:sld>
+</file>
+
+<file path=ppt/slides/slide6.xml><?xml version="1.0" encoding="utf-8"?>
+<p:sld xmlns:a="http://schemas.openxmlformats.org/drawingml/2006/main" xmlns:r="http://schemas.openxmlformats.org/officeDocument/2006/relationships" xmlns:p="http://schemas.openxmlformats.org/presentationml/2006/main">
+  <p:cSld>
+    <p:spTree>
+      <p:nvGrpSpPr>
+        <p:cNvPr id="1" name=""/>
+        <p:cNvGrpSpPr/>
+        <p:nvPr/>
+      </p:nvGrpSpPr>
+      <p:grpSpPr>
+        <a:xfrm>
+          <a:off x="0" y="0"/>
+          <a:ext cx="0" cy="0"/>
+          <a:chOff x="0" y="0"/>
+          <a:chExt cx="0" cy="0"/>
+        </a:xfrm>
+      </p:grpSpPr>
       <p:sp>
         <p:nvSpPr>
-          <p:cNvPr id="3" name="Espaço Reservado para Conteúdo 2">
+          <p:cNvPr id="2" name="Título 1">
             <a:extLst>
               <a:ext uri="{FF2B5EF4-FFF2-40B4-BE49-F238E27FC236}">
-                <a16:creationId xmlns:a16="http://schemas.microsoft.com/office/drawing/2014/main" id="{C4B45AAC-553F-4406-BF99-DEF2C8D23469}"/>
+                <a16:creationId xmlns:a16="http://schemas.microsoft.com/office/drawing/2014/main" id="{B1BDF05E-08C2-47AC-995A-F9C4B7F02D88}"/>
               </a:ext>
             </a:extLst>
           </p:cNvPr>
@@ -13997,7 +14159,7 @@
             <a:spLocks noGrp="1"/>
           </p:cNvSpPr>
           <p:nvPr>
-            <p:ph idx="1"/>
+            <p:ph type="title"/>
           </p:nvPr>
         </p:nvSpPr>
         <p:spPr/>
@@ -14009,10 +14171,69 @@
           </a:p>
         </p:txBody>
       </p:sp>
+      <p:pic>
+        <p:nvPicPr>
+          <p:cNvPr id="5" name="Espaço Reservado para Conteúdo 4">
+            <a:extLst>
+              <a:ext uri="{FF2B5EF4-FFF2-40B4-BE49-F238E27FC236}">
+                <a16:creationId xmlns:a16="http://schemas.microsoft.com/office/drawing/2014/main" id="{7632AF23-2AF8-45B5-8177-A41E1DA73ED8}"/>
+              </a:ext>
+            </a:extLst>
+          </p:cNvPr>
+          <p:cNvPicPr>
+            <a:picLocks noGrp="1" noChangeAspect="1"/>
+          </p:cNvPicPr>
+          <p:nvPr>
+            <p:ph idx="1"/>
+          </p:nvPr>
+        </p:nvPicPr>
+        <p:blipFill>
+          <a:blip r:embed="rId2"/>
+          <a:stretch>
+            <a:fillRect/>
+          </a:stretch>
+        </p:blipFill>
+        <p:spPr>
+          <a:xfrm>
+            <a:off x="502275" y="2831403"/>
+            <a:ext cx="5473521" cy="3175518"/>
+          </a:xfrm>
+        </p:spPr>
+      </p:pic>
+      <p:pic>
+        <p:nvPicPr>
+          <p:cNvPr id="7" name="Imagem 6">
+            <a:extLst>
+              <a:ext uri="{FF2B5EF4-FFF2-40B4-BE49-F238E27FC236}">
+                <a16:creationId xmlns:a16="http://schemas.microsoft.com/office/drawing/2014/main" id="{4DA4D170-CCF1-4606-B5F2-1A35327D4244}"/>
+              </a:ext>
+            </a:extLst>
+          </p:cNvPr>
+          <p:cNvPicPr>
+            <a:picLocks noChangeAspect="1"/>
+          </p:cNvPicPr>
+          <p:nvPr/>
+        </p:nvPicPr>
+        <p:blipFill>
+          <a:blip r:embed="rId3"/>
+          <a:stretch>
+            <a:fillRect/>
+          </a:stretch>
+        </p:blipFill>
+        <p:spPr>
+          <a:xfrm>
+            <a:off x="6091709" y="2831403"/>
+            <a:ext cx="5620512" cy="3159995"/>
+          </a:xfrm>
+          <a:prstGeom prst="rect">
+            <a:avLst/>
+          </a:prstGeom>
+        </p:spPr>
+      </p:pic>
     </p:spTree>
     <p:extLst>
       <p:ext uri="{BB962C8B-B14F-4D97-AF65-F5344CB8AC3E}">
-        <p14:creationId xmlns:p14="http://schemas.microsoft.com/office/powerpoint/2010/main" val="2742067459"/>
+        <p14:creationId xmlns:p14="http://schemas.microsoft.com/office/powerpoint/2010/main" val="2914233779"/>
       </p:ext>
     </p:extLst>
   </p:cSld>

</xml_diff>